<commit_message>
Actualizacion metamodelo, participantes y financiero
</commit_message>
<xml_diff>
--- a/HT-6/Optica BAC-09-Metamodelo.pptx
+++ b/HT-6/Optica BAC-09-Metamodelo.pptx
@@ -213,7 +213,7 @@
           <a:p>
             <a:fld id="{C84E95E0-43A6-4D53-BDBE-E8A6E9BC4F1E}" type="datetimeFigureOut">
               <a:rPr lang="es-ES" smtClean="0"/>
-              <a:t>12/9/22</a:t>
+              <a:t>20/09/2022</a:t>
             </a:fld>
             <a:endParaRPr lang="es-ES"/>
           </a:p>
@@ -371,7 +371,7 @@
           <a:p>
             <a:fld id="{A7ACAE50-97D0-47A2-B9C8-25667F34B8EA}" type="slidenum">
               <a:rPr lang="es-ES" smtClean="0"/>
-              <a:t>‹#›</a:t>
+              <a:t>‹Nº›</a:t>
             </a:fld>
             <a:endParaRPr lang="es-ES"/>
           </a:p>
@@ -1146,7 +1146,7 @@
             <a:fld id="{57F581D2-D2F7-4C56-ADAA-56285F38747F}" type="slidenum">
               <a:rPr lang="es-ES" smtClean="0"/>
               <a:pPr/>
-              <a:t>‹#›</a:t>
+              <a:t>‹Nº›</a:t>
             </a:fld>
             <a:endParaRPr lang="es-ES" dirty="0"/>
           </a:p>
@@ -1520,7 +1520,7 @@
           <a:p>
             <a:fld id="{57F581D2-D2F7-4C56-ADAA-56285F38747F}" type="slidenum">
               <a:rPr lang="es-ES" smtClean="0"/>
-              <a:t>‹#›</a:t>
+              <a:t>‹Nº›</a:t>
             </a:fld>
             <a:endParaRPr lang="es-ES"/>
           </a:p>
@@ -2103,10 +2103,10 @@
       </p:sp>
       <p:pic>
         <p:nvPicPr>
-          <p:cNvPr id="11" name="Picture 10">
+          <p:cNvPr id="4" name="Imagen 3">
             <a:extLst>
               <a:ext uri="{FF2B5EF4-FFF2-40B4-BE49-F238E27FC236}">
-                <a16:creationId xmlns:a16="http://schemas.microsoft.com/office/drawing/2014/main" id="{90F26F23-1F23-0F0E-C6EF-48BF63C7BBFF}"/>
+                <a16:creationId xmlns:a16="http://schemas.microsoft.com/office/drawing/2014/main" id="{9F78B786-EF34-3001-58EF-07B68FF7EEC8}"/>
               </a:ext>
             </a:extLst>
           </p:cNvPr>
@@ -2116,21 +2116,15 @@
           <p:nvPr/>
         </p:nvPicPr>
         <p:blipFill>
-          <a:blip r:embed="rId2">
-            <a:extLst>
-              <a:ext uri="{28A0092B-C50C-407E-A947-70E740481C1C}">
-                <a14:useLocalDpi xmlns:a14="http://schemas.microsoft.com/office/drawing/2010/main" val="0"/>
-              </a:ext>
-            </a:extLst>
-          </a:blip>
+          <a:blip r:embed="rId2"/>
           <a:stretch>
             <a:fillRect/>
           </a:stretch>
         </p:blipFill>
         <p:spPr>
           <a:xfrm>
-            <a:off x="1541414" y="412352"/>
-            <a:ext cx="9109170" cy="5662456"/>
+            <a:off x="1768251" y="396888"/>
+            <a:ext cx="8655495" cy="5410478"/>
           </a:xfrm>
           <a:prstGeom prst="rect">
             <a:avLst/>

</xml_diff>